<commit_message>
Cambios en los archivos
Se agregaron conclusiones
</commit_message>
<xml_diff>
--- a/Modelo lotka-volterra.pptx
+++ b/Modelo lotka-volterra.pptx
@@ -5,7 +5,7 @@
     <p:sldMasterId id="2147483659" r:id="rId1"/>
   </p:sldMasterIdLst>
   <p:notesMasterIdLst>
-    <p:notesMasterId r:id="rId12"/>
+    <p:notesMasterId r:id="rId13"/>
   </p:notesMasterIdLst>
   <p:sldIdLst>
     <p:sldId id="256" r:id="rId2"/>
@@ -13,33 +13,34 @@
     <p:sldId id="258" r:id="rId4"/>
     <p:sldId id="259" r:id="rId5"/>
     <p:sldId id="262" r:id="rId6"/>
-    <p:sldId id="264" r:id="rId7"/>
-    <p:sldId id="269" r:id="rId8"/>
-    <p:sldId id="268" r:id="rId9"/>
-    <p:sldId id="272" r:id="rId10"/>
-    <p:sldId id="266" r:id="rId11"/>
+    <p:sldId id="273" r:id="rId7"/>
+    <p:sldId id="264" r:id="rId8"/>
+    <p:sldId id="269" r:id="rId9"/>
+    <p:sldId id="268" r:id="rId10"/>
+    <p:sldId id="272" r:id="rId11"/>
+    <p:sldId id="266" r:id="rId12"/>
   </p:sldIdLst>
   <p:sldSz cx="9144000" cy="5143500" type="screen16x9"/>
   <p:notesSz cx="6858000" cy="9144000"/>
   <p:embeddedFontLst>
     <p:embeddedFont>
       <p:font typeface="Amatic SC" panose="020B0604020202020204" charset="-79"/>
-      <p:regular r:id="rId13"/>
-      <p:bold r:id="rId14"/>
+      <p:regular r:id="rId14"/>
+      <p:bold r:id="rId15"/>
     </p:embeddedFont>
     <p:embeddedFont>
       <p:font typeface="Source Code Pro" panose="020B0604020202020204" charset="0"/>
-      <p:regular r:id="rId15"/>
-      <p:bold r:id="rId16"/>
-      <p:italic r:id="rId17"/>
-      <p:boldItalic r:id="rId18"/>
+      <p:regular r:id="rId16"/>
+      <p:bold r:id="rId17"/>
+      <p:italic r:id="rId18"/>
+      <p:boldItalic r:id="rId19"/>
     </p:embeddedFont>
     <p:embeddedFont>
       <p:font typeface="Source Code Pro Medium" panose="020B0604020202020204" charset="0"/>
-      <p:regular r:id="rId19"/>
-      <p:bold r:id="rId20"/>
-      <p:italic r:id="rId21"/>
-      <p:boldItalic r:id="rId22"/>
+      <p:regular r:id="rId20"/>
+      <p:bold r:id="rId21"/>
+      <p:italic r:id="rId22"/>
+      <p:boldItalic r:id="rId23"/>
     </p:embeddedFont>
   </p:embeddedFontLst>
   <p:defaultTextStyle>
@@ -1160,7 +1161,7 @@
               </a:spcAft>
               <a:buNone/>
             </a:pPr>
-            <a:endParaRPr/>
+            <a:endParaRPr dirty="0"/>
           </a:p>
         </p:txBody>
       </p:sp>
@@ -1264,7 +1265,7 @@
               </a:spcAft>
               <a:buNone/>
             </a:pPr>
-            <a:endParaRPr/>
+            <a:endParaRPr dirty="0"/>
           </a:p>
         </p:txBody>
       </p:sp>
@@ -1368,7 +1369,7 @@
               </a:spcAft>
               <a:buNone/>
             </a:pPr>
-            <a:endParaRPr/>
+            <a:endParaRPr dirty="0"/>
           </a:p>
         </p:txBody>
       </p:sp>
@@ -1472,7 +1473,7 @@
               </a:spcAft>
               <a:buNone/>
             </a:pPr>
-            <a:endParaRPr/>
+            <a:endParaRPr dirty="0"/>
           </a:p>
         </p:txBody>
       </p:sp>
@@ -1576,7 +1577,7 @@
               </a:spcAft>
               <a:buNone/>
             </a:pPr>
-            <a:endParaRPr/>
+            <a:endParaRPr dirty="0"/>
           </a:p>
         </p:txBody>
       </p:sp>
@@ -1680,7 +1681,7 @@
               </a:spcAft>
               <a:buNone/>
             </a:pPr>
-            <a:endParaRPr/>
+            <a:endParaRPr dirty="0"/>
           </a:p>
         </p:txBody>
       </p:sp>
@@ -1784,7 +1785,7 @@
               </a:spcAft>
               <a:buNone/>
             </a:pPr>
-            <a:endParaRPr/>
+            <a:endParaRPr dirty="0"/>
           </a:p>
         </p:txBody>
       </p:sp>
@@ -1857,7 +1858,7 @@
               </a:spcAft>
               <a:buNone/>
             </a:pPr>
-            <a:endParaRPr/>
+            <a:endParaRPr dirty="0"/>
           </a:p>
         </p:txBody>
       </p:sp>
@@ -2284,7 +2285,7 @@
               <a:rPr lang="es-419"/>
               <a:t>‹Nº›</a:t>
             </a:fld>
-            <a:endParaRPr/>
+            <a:endParaRPr dirty="0"/>
           </a:p>
         </p:txBody>
       </p:sp>
@@ -2388,7 +2389,7 @@
               <a:rPr lang="es-419"/>
               <a:t>‹Nº›</a:t>
             </a:fld>
-            <a:endParaRPr/>
+            <a:endParaRPr dirty="0"/>
           </a:p>
         </p:txBody>
       </p:sp>
@@ -2632,7 +2633,7 @@
               <a:rPr lang="es-419"/>
               <a:t>‹Nº›</a:t>
             </a:fld>
-            <a:endParaRPr/>
+            <a:endParaRPr dirty="0"/>
           </a:p>
         </p:txBody>
       </p:sp>
@@ -2994,7 +2995,7 @@
               <a:rPr lang="es-419"/>
               <a:t>‹Nº›</a:t>
             </a:fld>
-            <a:endParaRPr/>
+            <a:endParaRPr dirty="0"/>
           </a:p>
         </p:txBody>
       </p:sp>
@@ -3485,7 +3486,7 @@
               <a:rPr lang="es-419"/>
               <a:t>‹Nº›</a:t>
             </a:fld>
-            <a:endParaRPr/>
+            <a:endParaRPr dirty="0"/>
           </a:p>
         </p:txBody>
       </p:sp>
@@ -3718,7 +3719,7 @@
               <a:rPr lang="es-419"/>
               <a:t>‹Nº›</a:t>
             </a:fld>
-            <a:endParaRPr/>
+            <a:endParaRPr dirty="0"/>
           </a:p>
         </p:txBody>
       </p:sp>
@@ -4116,7 +4117,7 @@
               <a:rPr lang="es-419"/>
               <a:t>‹Nº›</a:t>
             </a:fld>
-            <a:endParaRPr/>
+            <a:endParaRPr dirty="0"/>
           </a:p>
         </p:txBody>
       </p:sp>
@@ -4456,7 +4457,7 @@
               <a:rPr lang="es-419"/>
               <a:t>‹Nº›</a:t>
             </a:fld>
-            <a:endParaRPr/>
+            <a:endParaRPr dirty="0"/>
           </a:p>
         </p:txBody>
       </p:sp>
@@ -4521,7 +4522,7 @@
               </a:spcAft>
               <a:buNone/>
             </a:pPr>
-            <a:endParaRPr/>
+            <a:endParaRPr dirty="0"/>
           </a:p>
         </p:txBody>
       </p:sp>
@@ -5130,7 +5131,7 @@
               <a:rPr lang="es-419"/>
               <a:t>‹Nº›</a:t>
             </a:fld>
-            <a:endParaRPr/>
+            <a:endParaRPr dirty="0"/>
           </a:p>
         </p:txBody>
       </p:sp>
@@ -5674,7 +5675,7 @@
               <a:rPr lang="es-419"/>
               <a:t>‹Nº›</a:t>
             </a:fld>
-            <a:endParaRPr/>
+            <a:endParaRPr dirty="0"/>
           </a:p>
         </p:txBody>
       </p:sp>
@@ -6371,7 +6372,7 @@
               <a:rPr lang="es-419"/>
               <a:t>‹Nº›</a:t>
             </a:fld>
-            <a:endParaRPr/>
+            <a:endParaRPr dirty="0"/>
           </a:p>
         </p:txBody>
       </p:sp>
@@ -7177,10 +7178,10 @@
               <a:buNone/>
             </a:pPr>
             <a:r>
-              <a:rPr lang="es-419"/>
+              <a:rPr lang="es-419" dirty="0"/>
               <a:t>Equipo:</a:t>
             </a:r>
-            <a:endParaRPr/>
+            <a:endParaRPr dirty="0"/>
           </a:p>
           <a:p>
             <a:pPr marL="0" lvl="0" indent="0" algn="ctr" rtl="0">
@@ -7193,10 +7194,10 @@
               <a:buNone/>
             </a:pPr>
             <a:r>
-              <a:rPr lang="es-419"/>
+              <a:rPr lang="es-419" dirty="0"/>
               <a:t>Carolina Barba Anaya</a:t>
             </a:r>
-            <a:endParaRPr/>
+            <a:endParaRPr dirty="0"/>
           </a:p>
           <a:p>
             <a:pPr marL="0" lvl="0" indent="0" algn="ctr" rtl="0">
@@ -7209,10 +7210,10 @@
               <a:buNone/>
             </a:pPr>
             <a:r>
-              <a:rPr lang="es-419"/>
+              <a:rPr lang="es-419" dirty="0"/>
               <a:t>Marco Antonio Ochoa Cárdenas </a:t>
             </a:r>
-            <a:endParaRPr/>
+            <a:endParaRPr dirty="0"/>
           </a:p>
           <a:p>
             <a:pPr marL="0" lvl="0" indent="0" algn="ctr" rtl="0">
@@ -7225,10 +7226,10 @@
               <a:buNone/>
             </a:pPr>
             <a:r>
-              <a:rPr lang="es-419"/>
-              <a:t>Jose Eduardo Ramos Michel</a:t>
+              <a:rPr lang="es-419" dirty="0"/>
+              <a:t>José Eduardo Ramos Michel</a:t>
             </a:r>
-            <a:endParaRPr/>
+            <a:endParaRPr dirty="0"/>
           </a:p>
         </p:txBody>
       </p:sp>
@@ -7241,6 +7242,139 @@
 </file>
 
 <file path=ppt/slides/slide10.xml><?xml version="1.0" encoding="utf-8"?>
+<p:sld xmlns:a="http://schemas.openxmlformats.org/drawingml/2006/main" xmlns:r="http://schemas.openxmlformats.org/officeDocument/2006/relationships" xmlns:p="http://schemas.openxmlformats.org/presentationml/2006/main">
+  <p:cSld>
+    <p:spTree>
+      <p:nvGrpSpPr>
+        <p:cNvPr id="1" name=""/>
+        <p:cNvGrpSpPr/>
+        <p:nvPr/>
+      </p:nvGrpSpPr>
+      <p:grpSpPr>
+        <a:xfrm>
+          <a:off x="0" y="0"/>
+          <a:ext cx="0" cy="0"/>
+          <a:chOff x="0" y="0"/>
+          <a:chExt cx="0" cy="0"/>
+        </a:xfrm>
+      </p:grpSpPr>
+      <p:sp>
+        <p:nvSpPr>
+          <p:cNvPr id="3" name="Marcador de texto 2">
+            <a:extLst>
+              <a:ext uri="{FF2B5EF4-FFF2-40B4-BE49-F238E27FC236}">
+                <a16:creationId xmlns:a16="http://schemas.microsoft.com/office/drawing/2014/main" id="{F17C02C0-5375-45EF-84F5-A74D7CD6F4E3}"/>
+              </a:ext>
+            </a:extLst>
+          </p:cNvPr>
+          <p:cNvSpPr>
+            <a:spLocks noGrp="1"/>
+          </p:cNvSpPr>
+          <p:nvPr>
+            <p:ph type="body" idx="1"/>
+          </p:nvPr>
+        </p:nvSpPr>
+        <p:spPr>
+          <a:xfrm>
+            <a:off x="205375" y="1324368"/>
+            <a:ext cx="8520600" cy="3340200"/>
+          </a:xfrm>
+        </p:spPr>
+        <p:txBody>
+          <a:bodyPr/>
+          <a:lstStyle/>
+          <a:p>
+            <a:pPr marL="114300" indent="0">
+              <a:buNone/>
+            </a:pPr>
+            <a:r>
+              <a:rPr lang="es-MX" dirty="0">
+                <a:solidFill>
+                  <a:schemeClr val="accent1"/>
+                </a:solidFill>
+              </a:rPr>
+              <a:t>Este modelo es bastante interesante ya que no solo se puede llevar a ejemplos de cadena alimenticia, dentro de nuestra carrera podríamos utilizarlo para ver como se comportan los vendedores y las compradores en el mercado, utilizando esas variables como si fueran (presa-depredador) y así observar como fluctúan entre ellas, su relación, para poder observar como va el comercio y cuales son sus etapas.</a:t>
+            </a:r>
+            <a:endParaRPr lang="es-MX" dirty="0"/>
+          </a:p>
+        </p:txBody>
+      </p:sp>
+      <p:sp>
+        <p:nvSpPr>
+          <p:cNvPr id="4" name="Google Shape;122;p22">
+            <a:extLst>
+              <a:ext uri="{FF2B5EF4-FFF2-40B4-BE49-F238E27FC236}">
+                <a16:creationId xmlns:a16="http://schemas.microsoft.com/office/drawing/2014/main" id="{BA8AA6FB-0F70-4B45-9D98-60DD0A1F34FB}"/>
+              </a:ext>
+            </a:extLst>
+          </p:cNvPr>
+          <p:cNvSpPr/>
+          <p:nvPr/>
+        </p:nvSpPr>
+        <p:spPr>
+          <a:xfrm>
+            <a:off x="7125" y="292075"/>
+            <a:ext cx="5107800" cy="698100"/>
+          </a:xfrm>
+          <a:prstGeom prst="rect">
+            <a:avLst/>
+          </a:prstGeom>
+          <a:solidFill>
+            <a:schemeClr val="dk1"/>
+          </a:solidFill>
+          <a:ln w="9525" cap="flat" cmpd="sng">
+            <a:solidFill>
+              <a:schemeClr val="dk1"/>
+            </a:solidFill>
+            <a:prstDash val="solid"/>
+            <a:round/>
+            <a:headEnd type="none" w="sm" len="sm"/>
+            <a:tailEnd type="none" w="sm" len="sm"/>
+          </a:ln>
+        </p:spPr>
+        <p:txBody>
+          <a:bodyPr spcFirstLastPara="1" wrap="square" lIns="91425" tIns="91425" rIns="91425" bIns="91425" anchor="ctr" anchorCtr="0">
+            <a:noAutofit/>
+          </a:bodyPr>
+          <a:lstStyle/>
+          <a:p>
+            <a:pPr lvl="0"/>
+            <a:r>
+              <a:rPr lang="es-419" sz="4200" b="1" dirty="0">
+                <a:solidFill>
+                  <a:schemeClr val="accent1"/>
+                </a:solidFill>
+                <a:latin typeface="Amatic SC"/>
+                <a:cs typeface="Amatic SC"/>
+                <a:sym typeface="Amatic SC"/>
+              </a:rPr>
+              <a:t>Conclusión General </a:t>
+            </a:r>
+            <a:endParaRPr sz="4200" b="1" dirty="0">
+              <a:solidFill>
+                <a:schemeClr val="accent1"/>
+              </a:solidFill>
+              <a:latin typeface="Amatic SC"/>
+              <a:cs typeface="Amatic SC"/>
+              <a:sym typeface="Amatic SC"/>
+            </a:endParaRPr>
+          </a:p>
+        </p:txBody>
+      </p:sp>
+    </p:spTree>
+    <p:extLst>
+      <p:ext uri="{BB962C8B-B14F-4D97-AF65-F5344CB8AC3E}">
+        <p14:creationId xmlns:p14="http://schemas.microsoft.com/office/powerpoint/2010/main" val="1286840056"/>
+      </p:ext>
+    </p:extLst>
+  </p:cSld>
+  <p:clrMapOvr>
+    <a:masterClrMapping/>
+  </p:clrMapOvr>
+</p:sld>
+</file>
+
+<file path=ppt/slides/slide11.xml><?xml version="1.0" encoding="utf-8"?>
 <p:sld xmlns:a="http://schemas.openxmlformats.org/drawingml/2006/main" xmlns:r="http://schemas.openxmlformats.org/officeDocument/2006/relationships" xmlns:p="http://schemas.openxmlformats.org/presentationml/2006/main">
   <p:cSld>
     <p:spTree>
@@ -7299,7 +7433,7 @@
               </a:spcAft>
               <a:buNone/>
             </a:pPr>
-            <a:endParaRPr/>
+            <a:endParaRPr dirty="0"/>
           </a:p>
         </p:txBody>
       </p:sp>
@@ -7338,10 +7472,10 @@
               <a:buNone/>
             </a:pPr>
             <a:r>
-              <a:rPr lang="es-419"/>
+              <a:rPr lang="es-419" dirty="0"/>
               <a:t>Bibliografía</a:t>
             </a:r>
-            <a:endParaRPr/>
+            <a:endParaRPr dirty="0"/>
           </a:p>
         </p:txBody>
       </p:sp>
@@ -7472,7 +7606,7 @@
               </a:spcAft>
               <a:buNone/>
             </a:pPr>
-            <a:endParaRPr/>
+            <a:endParaRPr dirty="0"/>
           </a:p>
         </p:txBody>
       </p:sp>
@@ -7511,7 +7645,7 @@
               <a:buNone/>
             </a:pPr>
             <a:r>
-              <a:rPr lang="es-419" sz="3500">
+              <a:rPr lang="es-419" sz="3500" dirty="0">
                 <a:latin typeface="Source Code Pro"/>
                 <a:ea typeface="Source Code Pro"/>
                 <a:cs typeface="Source Code Pro"/>
@@ -7519,7 +7653,7 @@
               </a:rPr>
               <a:t>Índice</a:t>
             </a:r>
-            <a:endParaRPr sz="3500">
+            <a:endParaRPr sz="3500" dirty="0">
               <a:latin typeface="Source Code Pro"/>
               <a:ea typeface="Source Code Pro"/>
               <a:cs typeface="Source Code Pro"/>
@@ -7866,7 +8000,7 @@
               </a:spcAft>
               <a:buNone/>
             </a:pPr>
-            <a:endParaRPr/>
+            <a:endParaRPr dirty="0"/>
           </a:p>
         </p:txBody>
       </p:sp>
@@ -7924,7 +8058,7 @@
         </p:nvSpPr>
         <p:spPr>
           <a:xfrm>
-            <a:off x="311700" y="1093850"/>
+            <a:off x="311700" y="1232073"/>
             <a:ext cx="8520600" cy="3340200"/>
           </a:xfrm>
           <a:prstGeom prst="rect">
@@ -7941,18 +8075,18 @@
               <a:buNone/>
             </a:pPr>
             <a:r>
-              <a:rPr lang="es-ES" dirty="0"/>
-              <a:t>realizar un modelo presa-depredador, en este caso sería de leones-</a:t>
+              <a:rPr lang="es-MX" dirty="0">
+                <a:solidFill>
+                  <a:schemeClr val="accent1"/>
+                </a:solidFill>
+              </a:rPr>
+              <a:t>Realizar un modelo presa-depredador, en este caso sería de leones-antílopes, donde podamos observar como conforme decrece el número de presas, la población de depredadores decrece en algún momento como resultado de un menor suministro de alimento, y con un decrecimiento en el número de depredadores hay un incremento en el número de presas; y así observar como es la relación del incremento y decrecimiento de cada uno.</a:t>
             </a:r>
-            <a:r>
-              <a:rPr lang="es-ES" dirty="0" err="1"/>
-              <a:t>antilopes</a:t>
-            </a:r>
-            <a:r>
-              <a:rPr lang="es-ES" dirty="0"/>
-              <a:t>, donde podamos observar como conforme decrece el numero de presas, la población de depredadores decrece en algún momento como resultado de un menos suministro de alimento, y junto con un decrecimiento en el numero de depredadores hay un incremento en el numero de presas; esto a su vez va a dar lugar a un mayor numero de depredadores, que en una última instancia origina otro decrecimiento en el numero de presas. </a:t>
-            </a:r>
-            <a:endParaRPr dirty="0"/>
+            <a:endParaRPr dirty="0">
+              <a:solidFill>
+                <a:schemeClr val="accent1"/>
+              </a:solidFill>
+            </a:endParaRPr>
           </a:p>
         </p:txBody>
       </p:sp>
@@ -8023,7 +8157,7 @@
               </a:spcAft>
               <a:buNone/>
             </a:pPr>
-            <a:endParaRPr/>
+            <a:endParaRPr dirty="0"/>
           </a:p>
         </p:txBody>
       </p:sp>
@@ -8062,10 +8196,10 @@
               <a:buNone/>
             </a:pPr>
             <a:r>
-              <a:rPr lang="es-419"/>
+              <a:rPr lang="es-419" dirty="0"/>
               <a:t>Objetivos específicos:</a:t>
             </a:r>
-            <a:endParaRPr/>
+            <a:endParaRPr dirty="0"/>
           </a:p>
         </p:txBody>
       </p:sp>
@@ -8228,7 +8362,7 @@
               </a:spcAft>
               <a:buNone/>
             </a:pPr>
-            <a:endParaRPr/>
+            <a:endParaRPr dirty="0"/>
           </a:p>
         </p:txBody>
       </p:sp>
@@ -8267,10 +8401,10 @@
               <a:buNone/>
             </a:pPr>
             <a:r>
-              <a:rPr lang="es-419"/>
+              <a:rPr lang="es-419" dirty="0"/>
               <a:t>Modelo del programa</a:t>
             </a:r>
-            <a:endParaRPr/>
+            <a:endParaRPr dirty="0"/>
           </a:p>
         </p:txBody>
       </p:sp>
@@ -8287,7 +8421,7 @@
         <p:spPr>
           <a:xfrm>
             <a:off x="243276" y="1175512"/>
-            <a:ext cx="8520600" cy="3340200"/>
+            <a:ext cx="8520600" cy="3470916"/>
           </a:xfrm>
           <a:prstGeom prst="rect">
             <a:avLst/>
@@ -8314,24 +8448,176 @@
                   <a:schemeClr val="accent1"/>
                 </a:solidFill>
               </a:rPr>
-              <a:t>El modelo </a:t>
+              <a:t>El modelo lotka-volterra es una ecuación diferencial usada para simular el caso presa-depredador en el cual se simula en caso de que haya mas o menos presas y/o depredadores cual sería el resultado de la cadena alimenticia.</a:t>
+            </a:r>
+          </a:p>
+          <a:p>
+            <a:pPr marL="0" lvl="0" indent="0" algn="l" rtl="0">
+              <a:spcBef>
+                <a:spcPts val="0"/>
+              </a:spcBef>
+              <a:spcAft>
+                <a:spcPts val="0"/>
+              </a:spcAft>
+              <a:buNone/>
+            </a:pPr>
+            <a:endParaRPr lang="es-MX" dirty="0">
+              <a:solidFill>
+                <a:schemeClr val="accent1"/>
+              </a:solidFill>
+            </a:endParaRPr>
+          </a:p>
+          <a:p>
+            <a:pPr marL="0" lvl="0" indent="0">
+              <a:buNone/>
+            </a:pPr>
+            <a:r>
+              <a:rPr lang="es-MX" altLang="es-MX" dirty="0">
+                <a:solidFill>
+                  <a:schemeClr val="accent1"/>
+                </a:solidFill>
+              </a:rPr>
+              <a:t>Se trata de un sistema de dos ecuaciones diferenciales de primer orden, acopladas, autónomas y no lineales:</a:t>
+            </a:r>
+          </a:p>
+          <a:p>
+            <a:pPr marL="0" lvl="0" indent="0">
+              <a:buNone/>
+            </a:pPr>
+            <a:br>
+              <a:rPr lang="es-MX" altLang="es-MX" dirty="0">
+                <a:solidFill>
+                  <a:schemeClr val="accent1"/>
+                </a:solidFill>
+              </a:rPr>
+            </a:br>
+            <a:r>
+              <a:rPr lang="es-MX" altLang="es-MX" dirty="0" err="1">
+                <a:solidFill>
+                  <a:schemeClr val="accent1"/>
+                </a:solidFill>
+              </a:rPr>
+              <a:t>dx</a:t>
             </a:r>
             <a:r>
-              <a:rPr lang="es-MX" dirty="0" err="1">
+              <a:rPr lang="es-MX" altLang="es-MX" dirty="0">
                 <a:solidFill>
                   <a:schemeClr val="accent1"/>
                 </a:solidFill>
               </a:rPr>
-              <a:t>lotka-volterra</a:t>
+              <a:t>/</a:t>
             </a:r>
             <a:r>
-              <a:rPr lang="es-MX" dirty="0">
+              <a:rPr lang="es-MX" altLang="es-MX" dirty="0" err="1">
                 <a:solidFill>
                   <a:schemeClr val="accent1"/>
                 </a:solidFill>
               </a:rPr>
-              <a:t> es una ecuación diferencial usada para simular el caso presa-depredador en el cual se simula en caso de que haya mas o menos preses y/o depredadores cual seria el resultado de la cadena alimenticia</a:t>
+              <a:t>dt</a:t>
             </a:r>
+            <a:r>
+              <a:rPr lang="es-MX" altLang="es-MX" dirty="0">
+                <a:solidFill>
+                  <a:schemeClr val="accent1"/>
+                </a:solidFill>
+              </a:rPr>
+              <a:t>= αx – β</a:t>
+            </a:r>
+            <a:r>
+              <a:rPr lang="es-MX" altLang="es-MX" dirty="0" err="1">
+                <a:solidFill>
+                  <a:schemeClr val="accent1"/>
+                </a:solidFill>
+              </a:rPr>
+              <a:t>xy</a:t>
+            </a:r>
+            <a:r>
+              <a:rPr lang="es-MX" altLang="es-MX" dirty="0">
+                <a:solidFill>
+                  <a:schemeClr val="accent1"/>
+                </a:solidFill>
+              </a:rPr>
+              <a:t>      </a:t>
+            </a:r>
+            <a:br>
+              <a:rPr lang="es-MX" altLang="es-MX" dirty="0">
+                <a:solidFill>
+                  <a:schemeClr val="accent1"/>
+                </a:solidFill>
+              </a:rPr>
+            </a:br>
+            <a:r>
+              <a:rPr lang="es-MX" altLang="es-MX" dirty="0" err="1">
+                <a:solidFill>
+                  <a:schemeClr val="accent1"/>
+                </a:solidFill>
+              </a:rPr>
+              <a:t>dy</a:t>
+            </a:r>
+            <a:r>
+              <a:rPr lang="es-MX" altLang="es-MX" dirty="0">
+                <a:solidFill>
+                  <a:schemeClr val="accent1"/>
+                </a:solidFill>
+              </a:rPr>
+              <a:t>/</a:t>
+            </a:r>
+            <a:r>
+              <a:rPr lang="es-MX" altLang="es-MX" dirty="0" err="1">
+                <a:solidFill>
+                  <a:schemeClr val="accent1"/>
+                </a:solidFill>
+              </a:rPr>
+              <a:t>dt</a:t>
+            </a:r>
+            <a:r>
+              <a:rPr lang="es-MX" altLang="es-MX" dirty="0">
+                <a:solidFill>
+                  <a:schemeClr val="accent1"/>
+                </a:solidFill>
+              </a:rPr>
+              <a:t>= −</a:t>
+            </a:r>
+            <a:r>
+              <a:rPr lang="es-MX" altLang="es-MX" dirty="0" err="1">
+                <a:solidFill>
+                  <a:schemeClr val="accent1"/>
+                </a:solidFill>
+              </a:rPr>
+              <a:t>γy</a:t>
+            </a:r>
+            <a:r>
+              <a:rPr lang="es-MX" altLang="es-MX" dirty="0">
+                <a:solidFill>
+                  <a:schemeClr val="accent1"/>
+                </a:solidFill>
+              </a:rPr>
+              <a:t> + </a:t>
+            </a:r>
+            <a:r>
+              <a:rPr lang="es-MX" altLang="es-MX" dirty="0" err="1">
+                <a:solidFill>
+                  <a:schemeClr val="accent1"/>
+                </a:solidFill>
+              </a:rPr>
+              <a:t>δyx</a:t>
+            </a:r>
+            <a:endParaRPr lang="es-MX" dirty="0">
+              <a:solidFill>
+                <a:schemeClr val="accent1"/>
+              </a:solidFill>
+            </a:endParaRPr>
+          </a:p>
+          <a:p>
+            <a:pPr marL="0" lvl="0" indent="0" algn="l" rtl="0">
+              <a:spcBef>
+                <a:spcPts val="0"/>
+              </a:spcBef>
+              <a:spcAft>
+                <a:spcPts val="0"/>
+              </a:spcAft>
+              <a:buNone/>
+            </a:pPr>
             <a:endParaRPr dirty="0">
               <a:solidFill>
                 <a:schemeClr val="accent1"/>
@@ -8352,36 +8638,6 @@
           </a:p>
         </p:txBody>
       </p:sp>
-      <p:pic>
-        <p:nvPicPr>
-          <p:cNvPr id="2" name="Imagen 1">
-            <a:extLst>
-              <a:ext uri="{FF2B5EF4-FFF2-40B4-BE49-F238E27FC236}">
-                <a16:creationId xmlns:a16="http://schemas.microsoft.com/office/drawing/2014/main" id="{8E32F664-89E0-43C6-ACB3-535C1F2EFA0C}"/>
-              </a:ext>
-            </a:extLst>
-          </p:cNvPr>
-          <p:cNvPicPr>
-            <a:picLocks noChangeAspect="1"/>
-          </p:cNvPicPr>
-          <p:nvPr/>
-        </p:nvPicPr>
-        <p:blipFill>
-          <a:blip r:embed="rId3"/>
-          <a:stretch>
-            <a:fillRect/>
-          </a:stretch>
-        </p:blipFill>
-        <p:spPr>
-          <a:xfrm>
-            <a:off x="380124" y="2616988"/>
-            <a:ext cx="5347051" cy="1351000"/>
-          </a:xfrm>
-          <a:prstGeom prst="rect">
-            <a:avLst/>
-          </a:prstGeom>
-        </p:spPr>
-      </p:pic>
     </p:spTree>
   </p:cSld>
   <p:clrMapOvr>
@@ -8391,6 +8647,471 @@
 </file>
 
 <file path=ppt/slides/slide6.xml><?xml version="1.0" encoding="utf-8"?>
+<p:sld xmlns:a="http://schemas.openxmlformats.org/drawingml/2006/main" xmlns:r="http://schemas.openxmlformats.org/officeDocument/2006/relationships" xmlns:p="http://schemas.openxmlformats.org/presentationml/2006/main">
+  <p:cSld>
+    <p:spTree>
+      <p:nvGrpSpPr>
+        <p:cNvPr id="1" name=""/>
+        <p:cNvGrpSpPr/>
+        <p:nvPr/>
+      </p:nvGrpSpPr>
+      <p:grpSpPr>
+        <a:xfrm>
+          <a:off x="0" y="0"/>
+          <a:ext cx="0" cy="0"/>
+          <a:chOff x="0" y="0"/>
+          <a:chExt cx="0" cy="0"/>
+        </a:xfrm>
+      </p:grpSpPr>
+      <p:sp>
+        <p:nvSpPr>
+          <p:cNvPr id="4" name="Rectangle 1">
+            <a:extLst>
+              <a:ext uri="{FF2B5EF4-FFF2-40B4-BE49-F238E27FC236}">
+                <a16:creationId xmlns:a16="http://schemas.microsoft.com/office/drawing/2014/main" id="{F7C21FDD-F7BB-49B8-B114-8144DC2F6628}"/>
+              </a:ext>
+            </a:extLst>
+          </p:cNvPr>
+          <p:cNvSpPr>
+            <a:spLocks noGrp="1" noChangeArrowheads="1"/>
+          </p:cNvSpPr>
+          <p:nvPr>
+            <p:ph type="body" idx="1"/>
+          </p:nvPr>
+        </p:nvSpPr>
+        <p:spPr bwMode="auto">
+          <a:xfrm>
+            <a:off x="443186" y="546622"/>
+            <a:ext cx="7598411" cy="4050255"/>
+          </a:xfrm>
+          <a:prstGeom prst="rect">
+            <a:avLst/>
+          </a:prstGeom>
+          <a:solidFill>
+            <a:srgbClr val="FFFFFF"/>
+          </a:solidFill>
+          <a:ln>
+            <a:noFill/>
+          </a:ln>
+          <a:effectLst/>
+          <a:extLst>
+            <a:ext uri="{91240B29-F687-4F45-9708-019B960494DF}">
+              <a14:hiddenLine xmlns:a14="http://schemas.microsoft.com/office/drawing/2010/main" w="9525">
+                <a:solidFill>
+                  <a:schemeClr val="tx1"/>
+                </a:solidFill>
+                <a:miter lim="800000"/>
+                <a:headEnd/>
+                <a:tailEnd/>
+              </a14:hiddenLine>
+            </a:ext>
+            <a:ext uri="{AF507438-7753-43E0-B8FC-AC1667EBCBE1}">
+              <a14:hiddenEffects xmlns:a14="http://schemas.microsoft.com/office/drawing/2010/main">
+                <a:effectLst>
+                  <a:outerShdw dist="35921" dir="2700000" algn="ctr" rotWithShape="0">
+                    <a:schemeClr val="bg2"/>
+                  </a:outerShdw>
+                </a:effectLst>
+              </a14:hiddenEffects>
+            </a:ext>
+          </a:extLst>
+        </p:spPr>
+        <p:txBody>
+          <a:bodyPr vert="horz" wrap="square" lIns="0" tIns="133308" rIns="0" bIns="133308" numCol="1" anchor="ctr" anchorCtr="0" compatLnSpc="1">
+            <a:prstTxWarp prst="textNoShape">
+              <a:avLst/>
+            </a:prstTxWarp>
+            <a:spAutoFit/>
+          </a:bodyPr>
+          <a:lstStyle>
+            <a:lvl1pPr eaLnBrk="0" fontAlgn="base" hangingPunct="0">
+              <a:spcBef>
+                <a:spcPct val="0"/>
+              </a:spcBef>
+              <a:spcAft>
+                <a:spcPct val="0"/>
+              </a:spcAft>
+              <a:defRPr>
+                <a:solidFill>
+                  <a:schemeClr val="tx1"/>
+                </a:solidFill>
+                <a:latin typeface="Arial" panose="020B0604020202020204" pitchFamily="34" charset="0"/>
+              </a:defRPr>
+            </a:lvl1pPr>
+            <a:lvl2pPr marL="457200" eaLnBrk="0" fontAlgn="base" hangingPunct="0">
+              <a:spcBef>
+                <a:spcPct val="0"/>
+              </a:spcBef>
+              <a:spcAft>
+                <a:spcPct val="0"/>
+              </a:spcAft>
+              <a:defRPr>
+                <a:solidFill>
+                  <a:schemeClr val="tx1"/>
+                </a:solidFill>
+                <a:latin typeface="Arial" panose="020B0604020202020204" pitchFamily="34" charset="0"/>
+              </a:defRPr>
+            </a:lvl2pPr>
+            <a:lvl3pPr marL="914400" eaLnBrk="0" fontAlgn="base" hangingPunct="0">
+              <a:spcBef>
+                <a:spcPct val="0"/>
+              </a:spcBef>
+              <a:spcAft>
+                <a:spcPct val="0"/>
+              </a:spcAft>
+              <a:defRPr>
+                <a:solidFill>
+                  <a:schemeClr val="tx1"/>
+                </a:solidFill>
+                <a:latin typeface="Arial" panose="020B0604020202020204" pitchFamily="34" charset="0"/>
+              </a:defRPr>
+            </a:lvl3pPr>
+            <a:lvl4pPr marL="1371600" eaLnBrk="0" fontAlgn="base" hangingPunct="0">
+              <a:spcBef>
+                <a:spcPct val="0"/>
+              </a:spcBef>
+              <a:spcAft>
+                <a:spcPct val="0"/>
+              </a:spcAft>
+              <a:defRPr>
+                <a:solidFill>
+                  <a:schemeClr val="tx1"/>
+                </a:solidFill>
+                <a:latin typeface="Arial" panose="020B0604020202020204" pitchFamily="34" charset="0"/>
+              </a:defRPr>
+            </a:lvl4pPr>
+            <a:lvl5pPr marL="1828800" eaLnBrk="0" fontAlgn="base" hangingPunct="0">
+              <a:spcBef>
+                <a:spcPct val="0"/>
+              </a:spcBef>
+              <a:spcAft>
+                <a:spcPct val="0"/>
+              </a:spcAft>
+              <a:defRPr>
+                <a:solidFill>
+                  <a:schemeClr val="tx1"/>
+                </a:solidFill>
+                <a:latin typeface="Arial" panose="020B0604020202020204" pitchFamily="34" charset="0"/>
+              </a:defRPr>
+            </a:lvl5pPr>
+            <a:lvl6pPr marL="2286000" eaLnBrk="0" fontAlgn="base" hangingPunct="0">
+              <a:spcBef>
+                <a:spcPct val="0"/>
+              </a:spcBef>
+              <a:spcAft>
+                <a:spcPct val="0"/>
+              </a:spcAft>
+              <a:defRPr>
+                <a:solidFill>
+                  <a:schemeClr val="tx1"/>
+                </a:solidFill>
+                <a:latin typeface="Arial" panose="020B0604020202020204" pitchFamily="34" charset="0"/>
+              </a:defRPr>
+            </a:lvl6pPr>
+            <a:lvl7pPr marL="2743200" eaLnBrk="0" fontAlgn="base" hangingPunct="0">
+              <a:spcBef>
+                <a:spcPct val="0"/>
+              </a:spcBef>
+              <a:spcAft>
+                <a:spcPct val="0"/>
+              </a:spcAft>
+              <a:defRPr>
+                <a:solidFill>
+                  <a:schemeClr val="tx1"/>
+                </a:solidFill>
+                <a:latin typeface="Arial" panose="020B0604020202020204" pitchFamily="34" charset="0"/>
+              </a:defRPr>
+            </a:lvl7pPr>
+            <a:lvl8pPr marL="3200400" eaLnBrk="0" fontAlgn="base" hangingPunct="0">
+              <a:spcBef>
+                <a:spcPct val="0"/>
+              </a:spcBef>
+              <a:spcAft>
+                <a:spcPct val="0"/>
+              </a:spcAft>
+              <a:defRPr>
+                <a:solidFill>
+                  <a:schemeClr val="tx1"/>
+                </a:solidFill>
+                <a:latin typeface="Arial" panose="020B0604020202020204" pitchFamily="34" charset="0"/>
+              </a:defRPr>
+            </a:lvl8pPr>
+            <a:lvl9pPr marL="3657600" eaLnBrk="0" fontAlgn="base" hangingPunct="0">
+              <a:spcBef>
+                <a:spcPct val="0"/>
+              </a:spcBef>
+              <a:spcAft>
+                <a:spcPct val="0"/>
+              </a:spcAft>
+              <a:defRPr>
+                <a:solidFill>
+                  <a:schemeClr val="tx1"/>
+                </a:solidFill>
+                <a:latin typeface="Arial" panose="020B0604020202020204" pitchFamily="34" charset="0"/>
+              </a:defRPr>
+            </a:lvl9pPr>
+          </a:lstStyle>
+          <a:p>
+            <a:pPr marL="0" indent="0" defTabSz="914400" eaLnBrk="0" fontAlgn="base" latinLnBrk="0" hangingPunct="0">
+              <a:spcBef>
+                <a:spcPts val="0"/>
+              </a:spcBef>
+              <a:spcAft>
+                <a:spcPts val="0"/>
+              </a:spcAft>
+              <a:buNone/>
+              <a:tabLst/>
+            </a:pPr>
+            <a:r>
+              <a:rPr lang="es-MX" altLang="es-MX" dirty="0">
+                <a:solidFill>
+                  <a:schemeClr val="accent1"/>
+                </a:solidFill>
+                <a:latin typeface="Source Code Pro"/>
+              </a:rPr>
+              <a:t>Donde:</a:t>
+            </a:r>
+          </a:p>
+          <a:p>
+            <a:pPr marL="0" indent="0">
+              <a:spcBef>
+                <a:spcPts val="0"/>
+              </a:spcBef>
+              <a:spcAft>
+                <a:spcPts val="0"/>
+              </a:spcAft>
+              <a:buNone/>
+            </a:pPr>
+            <a:r>
+              <a:rPr lang="es-MX" altLang="es-MX" dirty="0">
+                <a:solidFill>
+                  <a:schemeClr val="accent1"/>
+                </a:solidFill>
+                <a:latin typeface="Source Code Pro"/>
+              </a:rPr>
+              <a:t> x : número de presas(5 antílopes)   </a:t>
+            </a:r>
+          </a:p>
+          <a:p>
+            <a:pPr marL="0" indent="0" defTabSz="914400" eaLnBrk="0" fontAlgn="base" latinLnBrk="0" hangingPunct="0">
+              <a:spcBef>
+                <a:spcPts val="0"/>
+              </a:spcBef>
+              <a:spcAft>
+                <a:spcPts val="0"/>
+              </a:spcAft>
+              <a:buNone/>
+              <a:tabLst/>
+            </a:pPr>
+            <a:r>
+              <a:rPr lang="es-MX" altLang="es-MX" dirty="0">
+                <a:solidFill>
+                  <a:schemeClr val="accent1"/>
+                </a:solidFill>
+                <a:latin typeface="Source Code Pro"/>
+              </a:rPr>
+              <a:t> y : es el número de depredadores(5 leones)</a:t>
+            </a:r>
+          </a:p>
+          <a:p>
+            <a:pPr marL="0" indent="0" defTabSz="914400" eaLnBrk="0" fontAlgn="base" latinLnBrk="0" hangingPunct="0">
+              <a:spcBef>
+                <a:spcPts val="0"/>
+              </a:spcBef>
+              <a:spcAft>
+                <a:spcPts val="0"/>
+              </a:spcAft>
+              <a:buNone/>
+              <a:tabLst/>
+            </a:pPr>
+            <a:r>
+              <a:rPr lang="es-MX" altLang="es-MX" dirty="0">
+                <a:solidFill>
+                  <a:schemeClr val="accent1"/>
+                </a:solidFill>
+                <a:latin typeface="Source Code Pro"/>
+              </a:rPr>
+              <a:t> </a:t>
+            </a:r>
+          </a:p>
+          <a:p>
+            <a:pPr marL="0" indent="0" defTabSz="914400" eaLnBrk="0" fontAlgn="base" latinLnBrk="0" hangingPunct="0">
+              <a:spcBef>
+                <a:spcPts val="0"/>
+              </a:spcBef>
+              <a:spcAft>
+                <a:spcPts val="0"/>
+              </a:spcAft>
+              <a:buNone/>
+              <a:tabLst/>
+            </a:pPr>
+            <a:r>
+              <a:rPr lang="es-MX" altLang="es-MX" dirty="0">
+                <a:solidFill>
+                  <a:schemeClr val="accent1"/>
+                </a:solidFill>
+                <a:latin typeface="Source Code Pro"/>
+              </a:rPr>
+              <a:t>Los parámetros son constantes positivas que representan:</a:t>
+            </a:r>
+          </a:p>
+          <a:p>
+            <a:pPr marL="0" indent="0" defTabSz="914400" eaLnBrk="0" fontAlgn="base" latinLnBrk="0" hangingPunct="0">
+              <a:spcBef>
+                <a:spcPts val="0"/>
+              </a:spcBef>
+              <a:spcAft>
+                <a:spcPts val="0"/>
+              </a:spcAft>
+              <a:buNone/>
+              <a:tabLst/>
+            </a:pPr>
+            <a:r>
+              <a:rPr lang="es-MX" altLang="es-MX" dirty="0">
+                <a:solidFill>
+                  <a:schemeClr val="accent1"/>
+                </a:solidFill>
+                <a:latin typeface="Source Code Pro"/>
+              </a:rPr>
+              <a:t>α: tasa de crecimiento de las presas.</a:t>
+            </a:r>
+          </a:p>
+          <a:p>
+            <a:pPr marL="0" indent="0" defTabSz="914400" eaLnBrk="0" fontAlgn="base" latinLnBrk="0" hangingPunct="0">
+              <a:spcBef>
+                <a:spcPts val="0"/>
+              </a:spcBef>
+              <a:spcAft>
+                <a:spcPts val="0"/>
+              </a:spcAft>
+              <a:buNone/>
+              <a:tabLst/>
+            </a:pPr>
+            <a:r>
+              <a:rPr lang="es-MX" altLang="es-MX" dirty="0">
+                <a:solidFill>
+                  <a:schemeClr val="accent1"/>
+                </a:solidFill>
+                <a:latin typeface="Source Code Pro"/>
+              </a:rPr>
+              <a:t>β: éxito en la caza del depredador.</a:t>
+            </a:r>
+          </a:p>
+          <a:p>
+            <a:pPr marL="0" indent="0" defTabSz="914400" eaLnBrk="0" fontAlgn="base" latinLnBrk="0" hangingPunct="0">
+              <a:spcBef>
+                <a:spcPts val="0"/>
+              </a:spcBef>
+              <a:spcAft>
+                <a:spcPts val="0"/>
+              </a:spcAft>
+              <a:buNone/>
+              <a:tabLst/>
+            </a:pPr>
+            <a:r>
+              <a:rPr lang="es-MX" altLang="es-MX" dirty="0">
+                <a:solidFill>
+                  <a:schemeClr val="accent1"/>
+                </a:solidFill>
+                <a:latin typeface="Source Code Pro"/>
+              </a:rPr>
+              <a:t>γ: tasa de decrecimiento de los depredadores.</a:t>
+            </a:r>
+          </a:p>
+          <a:p>
+            <a:pPr marL="0" indent="0" defTabSz="914400" eaLnBrk="0" fontAlgn="base" latinLnBrk="0" hangingPunct="0">
+              <a:spcBef>
+                <a:spcPts val="0"/>
+              </a:spcBef>
+              <a:spcAft>
+                <a:spcPts val="0"/>
+              </a:spcAft>
+              <a:buNone/>
+              <a:tabLst/>
+            </a:pPr>
+            <a:r>
+              <a:rPr lang="es-MX" altLang="es-MX" dirty="0">
+                <a:solidFill>
+                  <a:schemeClr val="accent1"/>
+                </a:solidFill>
+                <a:latin typeface="Source Code Pro"/>
+              </a:rPr>
+              <a:t>δ: éxito en la caza y cuánto alimenta cazar una presa al depredador.</a:t>
+            </a:r>
+          </a:p>
+          <a:p>
+            <a:pPr marL="0" marR="0" lvl="0" indent="0" algn="l" defTabSz="914400" rtl="0" eaLnBrk="0" fontAlgn="base" latinLnBrk="0" hangingPunct="0">
+              <a:lnSpc>
+                <a:spcPct val="100000"/>
+              </a:lnSpc>
+              <a:spcBef>
+                <a:spcPct val="0"/>
+              </a:spcBef>
+              <a:spcAft>
+                <a:spcPct val="0"/>
+              </a:spcAft>
+              <a:buClrTx/>
+              <a:buSzTx/>
+              <a:buFontTx/>
+              <a:buNone/>
+              <a:tabLst/>
+            </a:pPr>
+            <a:endParaRPr kumimoji="0" lang="es-MX" altLang="es-MX" sz="1800" b="0" i="0" u="none" strike="noStrike" cap="none" normalizeH="0" baseline="0" dirty="0">
+              <a:ln>
+                <a:noFill/>
+              </a:ln>
+              <a:solidFill>
+                <a:schemeClr val="tx1"/>
+              </a:solidFill>
+              <a:effectLst/>
+              <a:latin typeface="Arial" panose="020B0604020202020204" pitchFamily="34" charset="0"/>
+            </a:endParaRPr>
+          </a:p>
+        </p:txBody>
+      </p:sp>
+      <p:pic>
+        <p:nvPicPr>
+          <p:cNvPr id="5" name="Imagen 4">
+            <a:extLst>
+              <a:ext uri="{FF2B5EF4-FFF2-40B4-BE49-F238E27FC236}">
+                <a16:creationId xmlns:a16="http://schemas.microsoft.com/office/drawing/2014/main" id="{F59A29DC-C175-4836-809A-FAD1A36DB596}"/>
+              </a:ext>
+            </a:extLst>
+          </p:cNvPr>
+          <p:cNvPicPr>
+            <a:picLocks noChangeAspect="1"/>
+          </p:cNvPicPr>
+          <p:nvPr/>
+        </p:nvPicPr>
+        <p:blipFill rotWithShape="1">
+          <a:blip r:embed="rId2"/>
+          <a:srcRect l="45307" t="35753" r="40000" b="43563"/>
+          <a:stretch/>
+        </p:blipFill>
+        <p:spPr>
+          <a:xfrm>
+            <a:off x="6411432" y="315258"/>
+            <a:ext cx="2466754" cy="1952292"/>
+          </a:xfrm>
+          <a:prstGeom prst="rect">
+            <a:avLst/>
+          </a:prstGeom>
+        </p:spPr>
+      </p:pic>
+    </p:spTree>
+    <p:extLst>
+      <p:ext uri="{BB962C8B-B14F-4D97-AF65-F5344CB8AC3E}">
+        <p14:creationId xmlns:p14="http://schemas.microsoft.com/office/powerpoint/2010/main" val="2413487523"/>
+      </p:ext>
+    </p:extLst>
+  </p:cSld>
+  <p:clrMapOvr>
+    <a:masterClrMapping/>
+  </p:clrMapOvr>
+</p:sld>
+</file>
+
+<file path=ppt/slides/slide7.xml><?xml version="1.0" encoding="utf-8"?>
 <p:sld xmlns:a="http://schemas.openxmlformats.org/drawingml/2006/main" xmlns:r="http://schemas.openxmlformats.org/officeDocument/2006/relationships" xmlns:p="http://schemas.openxmlformats.org/presentationml/2006/main">
   <p:cSld>
     <p:spTree>
@@ -8449,7 +9170,7 @@
               </a:spcAft>
               <a:buNone/>
             </a:pPr>
-            <a:endParaRPr/>
+            <a:endParaRPr dirty="0"/>
           </a:p>
         </p:txBody>
       </p:sp>
@@ -8509,8 +9230,8 @@
         </p:nvSpPr>
         <p:spPr>
           <a:xfrm>
-            <a:off x="311700" y="1464469"/>
-            <a:ext cx="2045738" cy="1169551"/>
+            <a:off x="233916" y="1454560"/>
+            <a:ext cx="3427911" cy="1477328"/>
           </a:xfrm>
           <a:prstGeom prst="rect">
             <a:avLst/>
@@ -8524,7 +9245,13 @@
           <a:lstStyle/>
           <a:p>
             <a:r>
-              <a:rPr lang="es-MX" dirty="0"/>
+              <a:rPr lang="es-MX" sz="1800" dirty="0">
+                <a:solidFill>
+                  <a:schemeClr val="accent1"/>
+                </a:solidFill>
+                <a:latin typeface="Source Code Pro"/>
+                <a:ea typeface="Source Code Pro"/>
+              </a:rPr>
               <a:t>Solución del modelo donde se aprecia la población de presas y depredadores a través del tiempo</a:t>
             </a:r>
           </a:p>
@@ -8568,7 +9295,7 @@
 </p:sld>
 </file>
 
-<file path=ppt/slides/slide7.xml><?xml version="1.0" encoding="utf-8"?>
+<file path=ppt/slides/slide8.xml><?xml version="1.0" encoding="utf-8"?>
 <p:sld xmlns:a="http://schemas.openxmlformats.org/drawingml/2006/main" xmlns:r="http://schemas.openxmlformats.org/officeDocument/2006/relationships" xmlns:p="http://schemas.openxmlformats.org/presentationml/2006/main">
   <p:cSld>
     <p:spTree>
@@ -8599,8 +9326,8 @@
         </p:nvSpPr>
         <p:spPr>
           <a:xfrm>
-            <a:off x="1140374" y="1421606"/>
-            <a:ext cx="2302913" cy="1600438"/>
+            <a:off x="449258" y="804918"/>
+            <a:ext cx="2432166" cy="3139321"/>
           </a:xfrm>
           <a:prstGeom prst="rect">
             <a:avLst/>
@@ -8614,7 +9341,14 @@
           <a:lstStyle/>
           <a:p>
             <a:r>
-              <a:rPr lang="es-MX" dirty="0"/>
+              <a:rPr lang="es-MX" sz="1800" dirty="0">
+                <a:solidFill>
+                  <a:schemeClr val="accent1"/>
+                </a:solidFill>
+                <a:latin typeface="Source Code Pro"/>
+                <a:ea typeface="Source Code Pro"/>
+                <a:sym typeface="Source Code Pro"/>
+              </a:rPr>
               <a:t>Solución del modelo donde se aprecia la trayectoria de las poblaciones de las presas y depredadores cuando las poblaciones entre los dos fluctúan</a:t>
             </a:r>
           </a:p>
@@ -8642,7 +9376,7 @@
         </p:blipFill>
         <p:spPr>
           <a:xfrm>
-            <a:off x="3255074" y="114674"/>
+            <a:off x="3305081" y="229349"/>
             <a:ext cx="5838919" cy="4914151"/>
           </a:xfrm>
           <a:prstGeom prst="rect">
@@ -8663,7 +9397,7 @@
 </p:sld>
 </file>
 
-<file path=ppt/slides/slide8.xml><?xml version="1.0" encoding="utf-8"?>
+<file path=ppt/slides/slide9.xml><?xml version="1.0" encoding="utf-8"?>
 <p:sld xmlns:a="http://schemas.openxmlformats.org/drawingml/2006/main" xmlns:r="http://schemas.openxmlformats.org/officeDocument/2006/relationships" xmlns:p="http://schemas.openxmlformats.org/presentationml/2006/main">
   <p:cSld>
     <p:spTree>
@@ -8698,7 +9432,7 @@
         </p:nvSpPr>
         <p:spPr>
           <a:xfrm>
-            <a:off x="311700" y="1101084"/>
+            <a:off x="226639" y="1281837"/>
             <a:ext cx="8520600" cy="3340200"/>
           </a:xfrm>
         </p:spPr>
@@ -8706,9 +9440,16 @@
           <a:bodyPr/>
           <a:lstStyle/>
           <a:p>
+            <a:pPr marL="114300" indent="0">
+              <a:buNone/>
+            </a:pPr>
             <a:r>
-              <a:rPr lang="es-MX" dirty="0"/>
-              <a:t>El modelo nos da una referencia de como es que los animales que son presas tienen que tener un numero que satisfaga a los depredadores ya que de no ser así los depredadores mueren por falta de alimento</a:t>
+              <a:rPr lang="es-MX" dirty="0">
+                <a:solidFill>
+                  <a:schemeClr val="accent1"/>
+                </a:solidFill>
+              </a:rPr>
+              <a:t>Podemos concluir que conforme el número de leones aumenta, la población de antílopes decrece, y cuando sucede esto al pasar el tiempo los leones comienzan a pasar hambre lo cual provoca que empiecen a morir, y aumentan el número de antílopes, volviéndose un ciclo, sin embargo en nuestro modelo, nos dice que el final de esta cadena termina con más antílopes y menos leones</a:t>
             </a:r>
           </a:p>
         </p:txBody>
@@ -8779,136 +9520,6 @@
     <p:extLst>
       <p:ext uri="{BB962C8B-B14F-4D97-AF65-F5344CB8AC3E}">
         <p14:creationId xmlns:p14="http://schemas.microsoft.com/office/powerpoint/2010/main" val="2771333382"/>
-      </p:ext>
-    </p:extLst>
-  </p:cSld>
-  <p:clrMapOvr>
-    <a:masterClrMapping/>
-  </p:clrMapOvr>
-</p:sld>
-</file>
-
-<file path=ppt/slides/slide9.xml><?xml version="1.0" encoding="utf-8"?>
-<p:sld xmlns:a="http://schemas.openxmlformats.org/drawingml/2006/main" xmlns:r="http://schemas.openxmlformats.org/officeDocument/2006/relationships" xmlns:p="http://schemas.openxmlformats.org/presentationml/2006/main">
-  <p:cSld>
-    <p:spTree>
-      <p:nvGrpSpPr>
-        <p:cNvPr id="1" name=""/>
-        <p:cNvGrpSpPr/>
-        <p:nvPr/>
-      </p:nvGrpSpPr>
-      <p:grpSpPr>
-        <a:xfrm>
-          <a:off x="0" y="0"/>
-          <a:ext cx="0" cy="0"/>
-          <a:chOff x="0" y="0"/>
-          <a:chExt cx="0" cy="0"/>
-        </a:xfrm>
-      </p:grpSpPr>
-      <p:sp>
-        <p:nvSpPr>
-          <p:cNvPr id="3" name="Marcador de texto 2">
-            <a:extLst>
-              <a:ext uri="{FF2B5EF4-FFF2-40B4-BE49-F238E27FC236}">
-                <a16:creationId xmlns:a16="http://schemas.microsoft.com/office/drawing/2014/main" id="{F17C02C0-5375-45EF-84F5-A74D7CD6F4E3}"/>
-              </a:ext>
-            </a:extLst>
-          </p:cNvPr>
-          <p:cNvSpPr>
-            <a:spLocks noGrp="1"/>
-          </p:cNvSpPr>
-          <p:nvPr>
-            <p:ph type="body" idx="1"/>
-          </p:nvPr>
-        </p:nvSpPr>
-        <p:spPr/>
-        <p:txBody>
-          <a:bodyPr/>
-          <a:lstStyle/>
-          <a:p>
-            <a:pPr marL="114300" indent="0">
-              <a:buNone/>
-            </a:pPr>
-            <a:r>
-              <a:rPr lang="es-MX" dirty="0">
-                <a:solidFill>
-                  <a:schemeClr val="accent1"/>
-                </a:solidFill>
-              </a:rPr>
-              <a:t>Este modelo es bastante interesante ya que no solo se puede llevar a ejemplos de cadena alimenticia sino que cualquier forma que necesite de dos partes donde las dos tengas que ver se pueden aplicar, un caso sencillo seria los compradores sin los vendedores ya que si uno de estos dos no cumple su función no existiría el comercio.</a:t>
-            </a:r>
-          </a:p>
-          <a:p>
-            <a:endParaRPr lang="es-MX" dirty="0"/>
-          </a:p>
-        </p:txBody>
-      </p:sp>
-      <p:sp>
-        <p:nvSpPr>
-          <p:cNvPr id="4" name="Google Shape;122;p22">
-            <a:extLst>
-              <a:ext uri="{FF2B5EF4-FFF2-40B4-BE49-F238E27FC236}">
-                <a16:creationId xmlns:a16="http://schemas.microsoft.com/office/drawing/2014/main" id="{BA8AA6FB-0F70-4B45-9D98-60DD0A1F34FB}"/>
-              </a:ext>
-            </a:extLst>
-          </p:cNvPr>
-          <p:cNvSpPr/>
-          <p:nvPr/>
-        </p:nvSpPr>
-        <p:spPr>
-          <a:xfrm>
-            <a:off x="7125" y="292075"/>
-            <a:ext cx="5107800" cy="698100"/>
-          </a:xfrm>
-          <a:prstGeom prst="rect">
-            <a:avLst/>
-          </a:prstGeom>
-          <a:solidFill>
-            <a:schemeClr val="dk1"/>
-          </a:solidFill>
-          <a:ln w="9525" cap="flat" cmpd="sng">
-            <a:solidFill>
-              <a:schemeClr val="dk1"/>
-            </a:solidFill>
-            <a:prstDash val="solid"/>
-            <a:round/>
-            <a:headEnd type="none" w="sm" len="sm"/>
-            <a:tailEnd type="none" w="sm" len="sm"/>
-          </a:ln>
-        </p:spPr>
-        <p:txBody>
-          <a:bodyPr spcFirstLastPara="1" wrap="square" lIns="91425" tIns="91425" rIns="91425" bIns="91425" anchor="ctr" anchorCtr="0">
-            <a:noAutofit/>
-          </a:bodyPr>
-          <a:lstStyle/>
-          <a:p>
-            <a:pPr lvl="0"/>
-            <a:r>
-              <a:rPr lang="es-419" sz="4200" b="1" dirty="0">
-                <a:solidFill>
-                  <a:schemeClr val="accent1"/>
-                </a:solidFill>
-                <a:latin typeface="Amatic SC"/>
-                <a:cs typeface="Amatic SC"/>
-                <a:sym typeface="Amatic SC"/>
-              </a:rPr>
-              <a:t>Conclusión General </a:t>
-            </a:r>
-            <a:endParaRPr sz="4200" b="1" dirty="0">
-              <a:solidFill>
-                <a:schemeClr val="accent1"/>
-              </a:solidFill>
-              <a:latin typeface="Amatic SC"/>
-              <a:cs typeface="Amatic SC"/>
-              <a:sym typeface="Amatic SC"/>
-            </a:endParaRPr>
-          </a:p>
-        </p:txBody>
-      </p:sp>
-    </p:spTree>
-    <p:extLst>
-      <p:ext uri="{BB962C8B-B14F-4D97-AF65-F5344CB8AC3E}">
-        <p14:creationId xmlns:p14="http://schemas.microsoft.com/office/powerpoint/2010/main" val="1286840056"/>
       </p:ext>
     </p:extLst>
   </p:cSld>

</xml_diff>